<commit_message>
Classwork from Lecture 9 && Completed Assignment 3 - Blackjack (for now)
</commit_message>
<xml_diff>
--- a/Assesments/Week 3/Felt Image Templates.pptx
+++ b/Assesments/Week 3/Felt Image Templates.pptx
@@ -7,9 +7,12 @@
   <p:sldIdLst>
     <p:sldId id="256" r:id="rId2"/>
     <p:sldId id="257" r:id="rId3"/>
-    <p:sldId id="260" r:id="rId4"/>
-    <p:sldId id="259" r:id="rId5"/>
-    <p:sldId id="258" r:id="rId6"/>
+    <p:sldId id="261" r:id="rId4"/>
+    <p:sldId id="263" r:id="rId5"/>
+    <p:sldId id="262" r:id="rId6"/>
+    <p:sldId id="260" r:id="rId7"/>
+    <p:sldId id="259" r:id="rId8"/>
+    <p:sldId id="258" r:id="rId9"/>
   </p:sldIdLst>
   <p:sldSz cx="9144000" cy="6858000" type="screen4x3"/>
   <p:notesSz cx="6858000" cy="9144000"/>
@@ -292,7 +295,7 @@
           <a:p>
             <a:fld id="{BB669E8B-FEAC-F14C-8040-71596AC87F81}" type="datetimeFigureOut">
               <a:rPr lang="en-US" smtClean="0"/>
-              <a:t>1/26/15</a:t>
+              <a:t>1/27/15</a:t>
             </a:fld>
             <a:endParaRPr lang="en-US"/>
           </a:p>
@@ -462,7 +465,7 @@
           <a:p>
             <a:fld id="{BB669E8B-FEAC-F14C-8040-71596AC87F81}" type="datetimeFigureOut">
               <a:rPr lang="en-US" smtClean="0"/>
-              <a:t>1/26/15</a:t>
+              <a:t>1/27/15</a:t>
             </a:fld>
             <a:endParaRPr lang="en-US"/>
           </a:p>
@@ -642,7 +645,7 @@
           <a:p>
             <a:fld id="{BB669E8B-FEAC-F14C-8040-71596AC87F81}" type="datetimeFigureOut">
               <a:rPr lang="en-US" smtClean="0"/>
-              <a:t>1/26/15</a:t>
+              <a:t>1/27/15</a:t>
             </a:fld>
             <a:endParaRPr lang="en-US"/>
           </a:p>
@@ -812,7 +815,7 @@
           <a:p>
             <a:fld id="{BB669E8B-FEAC-F14C-8040-71596AC87F81}" type="datetimeFigureOut">
               <a:rPr lang="en-US" smtClean="0"/>
-              <a:t>1/26/15</a:t>
+              <a:t>1/27/15</a:t>
             </a:fld>
             <a:endParaRPr lang="en-US"/>
           </a:p>
@@ -1058,7 +1061,7 @@
           <a:p>
             <a:fld id="{BB669E8B-FEAC-F14C-8040-71596AC87F81}" type="datetimeFigureOut">
               <a:rPr lang="en-US" smtClean="0"/>
-              <a:t>1/26/15</a:t>
+              <a:t>1/27/15</a:t>
             </a:fld>
             <a:endParaRPr lang="en-US"/>
           </a:p>
@@ -1346,7 +1349,7 @@
           <a:p>
             <a:fld id="{BB669E8B-FEAC-F14C-8040-71596AC87F81}" type="datetimeFigureOut">
               <a:rPr lang="en-US" smtClean="0"/>
-              <a:t>1/26/15</a:t>
+              <a:t>1/27/15</a:t>
             </a:fld>
             <a:endParaRPr lang="en-US"/>
           </a:p>
@@ -1768,7 +1771,7 @@
           <a:p>
             <a:fld id="{BB669E8B-FEAC-F14C-8040-71596AC87F81}" type="datetimeFigureOut">
               <a:rPr lang="en-US" smtClean="0"/>
-              <a:t>1/26/15</a:t>
+              <a:t>1/27/15</a:t>
             </a:fld>
             <a:endParaRPr lang="en-US"/>
           </a:p>
@@ -1886,7 +1889,7 @@
           <a:p>
             <a:fld id="{BB669E8B-FEAC-F14C-8040-71596AC87F81}" type="datetimeFigureOut">
               <a:rPr lang="en-US" smtClean="0"/>
-              <a:t>1/26/15</a:t>
+              <a:t>1/27/15</a:t>
             </a:fld>
             <a:endParaRPr lang="en-US"/>
           </a:p>
@@ -1981,7 +1984,7 @@
           <a:p>
             <a:fld id="{BB669E8B-FEAC-F14C-8040-71596AC87F81}" type="datetimeFigureOut">
               <a:rPr lang="en-US" smtClean="0"/>
-              <a:t>1/26/15</a:t>
+              <a:t>1/27/15</a:t>
             </a:fld>
             <a:endParaRPr lang="en-US"/>
           </a:p>
@@ -2258,7 +2261,7 @@
           <a:p>
             <a:fld id="{BB669E8B-FEAC-F14C-8040-71596AC87F81}" type="datetimeFigureOut">
               <a:rPr lang="en-US" smtClean="0"/>
-              <a:t>1/26/15</a:t>
+              <a:t>1/27/15</a:t>
             </a:fld>
             <a:endParaRPr lang="en-US"/>
           </a:p>
@@ -2511,7 +2514,7 @@
           <a:p>
             <a:fld id="{BB669E8B-FEAC-F14C-8040-71596AC87F81}" type="datetimeFigureOut">
               <a:rPr lang="en-US" smtClean="0"/>
-              <a:t>1/26/15</a:t>
+              <a:t>1/27/15</a:t>
             </a:fld>
             <a:endParaRPr lang="en-US"/>
           </a:p>
@@ -2724,7 +2727,7 @@
           <a:p>
             <a:fld id="{BB669E8B-FEAC-F14C-8040-71596AC87F81}" type="datetimeFigureOut">
               <a:rPr lang="en-US" smtClean="0"/>
-              <a:t>1/26/15</a:t>
+              <a:t>1/27/15</a:t>
             </a:fld>
             <a:endParaRPr lang="en-US"/>
           </a:p>
@@ -3846,8 +3849,8 @@
         </p:nvSpPr>
         <p:spPr>
           <a:xfrm>
-            <a:off x="2776711" y="4471364"/>
-            <a:ext cx="2643716" cy="446276"/>
+            <a:off x="2811501" y="4552424"/>
+            <a:ext cx="2574142" cy="276999"/>
           </a:xfrm>
           <a:prstGeom prst="rect">
             <a:avLst/>
@@ -3863,15 +3866,17 @@
             <a:pPr algn="ctr"/>
             <a:r>
               <a:rPr lang="en-US" sz="1200" dirty="0" smtClean="0"/>
-              <a:t>Double tap to HIT, Pinch out to SPLIT;</a:t>
-            </a:r>
-          </a:p>
-          <a:p>
-            <a:pPr algn="ctr"/>
-            <a:r>
-              <a:rPr lang="en-US" sz="1100" dirty="0" smtClean="0"/>
-              <a:t>Swipe right to STAY, left to DOUBLE DOWN</a:t>
-            </a:r>
+              <a:t>Double tap to </a:t>
+            </a:r>
+            <a:r>
+              <a:rPr lang="en-US" sz="1200" dirty="0" smtClean="0"/>
+              <a:t>HIT</a:t>
+            </a:r>
+            <a:r>
+              <a:rPr lang="en-US" sz="1200" dirty="0" smtClean="0"/>
+              <a:t>, Swipe right to STAY</a:t>
+            </a:r>
+            <a:endParaRPr lang="en-US" sz="1100" dirty="0" smtClean="0"/>
           </a:p>
         </p:txBody>
       </p:sp>
@@ -5087,8 +5092,56 @@
         </p:nvSpPr>
         <p:spPr>
           <a:xfrm>
-            <a:off x="3209688" y="2796563"/>
-            <a:ext cx="1774630" cy="1405038"/>
+            <a:off x="3218751" y="4552860"/>
+            <a:ext cx="1774630" cy="364770"/>
+          </a:xfrm>
+          <a:prstGeom prst="rect">
+            <a:avLst/>
+          </a:prstGeom>
+          <a:noFill/>
+        </p:spPr>
+        <p:txBody>
+          <a:bodyPr wrap="square" rtlCol="0">
+            <a:prstTxWarp prst="textCanDown">
+              <a:avLst>
+                <a:gd name="adj" fmla="val 8733"/>
+              </a:avLst>
+            </a:prstTxWarp>
+            <a:spAutoFit/>
+          </a:bodyPr>
+          <a:lstStyle/>
+          <a:p>
+            <a:pPr algn="ctr"/>
+            <a:r>
+              <a:rPr lang="en-US" sz="1600" dirty="0" smtClean="0">
+                <a:solidFill>
+                  <a:srgbClr val="FFFF00"/>
+                </a:solidFill>
+                <a:latin typeface="Avenir Black"/>
+                <a:cs typeface="Avenir Black"/>
+              </a:rPr>
+              <a:t>PLAY AGAIN</a:t>
+            </a:r>
+            <a:endParaRPr lang="en-US" sz="1600" dirty="0">
+              <a:solidFill>
+                <a:srgbClr val="FFFF00"/>
+              </a:solidFill>
+              <a:latin typeface="Avenir Black"/>
+              <a:cs typeface="Avenir Black"/>
+            </a:endParaRPr>
+          </a:p>
+        </p:txBody>
+      </p:sp>
+      <p:sp>
+        <p:nvSpPr>
+          <p:cNvPr id="18" name="TextBox 17"/>
+          <p:cNvSpPr txBox="1"/>
+          <p:nvPr/>
+        </p:nvSpPr>
+        <p:spPr>
+          <a:xfrm>
+            <a:off x="3209688" y="2972193"/>
+            <a:ext cx="1774630" cy="648480"/>
           </a:xfrm>
           <a:prstGeom prst="rect">
             <a:avLst/>
@@ -5115,33 +5168,7 @@
                 <a:latin typeface="Avenir Black"/>
                 <a:cs typeface="Avenir Black"/>
               </a:rPr>
-              <a:t>SORRY</a:t>
-            </a:r>
-          </a:p>
-          <a:p>
-            <a:pPr algn="ctr"/>
-            <a:r>
-              <a:rPr lang="en-US" sz="1600" dirty="0" smtClean="0">
-                <a:solidFill>
-                  <a:srgbClr val="FF0000"/>
-                </a:solidFill>
-                <a:latin typeface="Avenir Black"/>
-                <a:cs typeface="Avenir Black"/>
-              </a:rPr>
-              <a:t>YOU </a:t>
-            </a:r>
-          </a:p>
-          <a:p>
-            <a:pPr algn="ctr"/>
-            <a:r>
-              <a:rPr lang="en-US" sz="1600" dirty="0" smtClean="0">
-                <a:solidFill>
-                  <a:srgbClr val="FF0000"/>
-                </a:solidFill>
-                <a:latin typeface="Avenir Black"/>
-                <a:cs typeface="Avenir Black"/>
-              </a:rPr>
-              <a:t>LOST</a:t>
+              <a:t>LOSER</a:t>
             </a:r>
             <a:endParaRPr lang="en-US" sz="1600" dirty="0">
               <a:solidFill>
@@ -5153,58 +5180,10 @@
           </a:p>
         </p:txBody>
       </p:sp>
-      <p:sp>
-        <p:nvSpPr>
-          <p:cNvPr id="18" name="TextBox 17"/>
-          <p:cNvSpPr txBox="1"/>
-          <p:nvPr/>
-        </p:nvSpPr>
-        <p:spPr>
-          <a:xfrm>
-            <a:off x="3218751" y="4552860"/>
-            <a:ext cx="1774630" cy="364770"/>
-          </a:xfrm>
-          <a:prstGeom prst="rect">
-            <a:avLst/>
-          </a:prstGeom>
-          <a:noFill/>
-        </p:spPr>
-        <p:txBody>
-          <a:bodyPr wrap="square" rtlCol="0">
-            <a:prstTxWarp prst="textCanDown">
-              <a:avLst>
-                <a:gd name="adj" fmla="val 8733"/>
-              </a:avLst>
-            </a:prstTxWarp>
-            <a:spAutoFit/>
-          </a:bodyPr>
-          <a:lstStyle/>
-          <a:p>
-            <a:pPr algn="ctr"/>
-            <a:r>
-              <a:rPr lang="en-US" sz="1600" dirty="0" smtClean="0">
-                <a:solidFill>
-                  <a:srgbClr val="FFFF00"/>
-                </a:solidFill>
-                <a:latin typeface="Avenir Black"/>
-                <a:cs typeface="Avenir Black"/>
-              </a:rPr>
-              <a:t>START OVER</a:t>
-            </a:r>
-            <a:endParaRPr lang="en-US" sz="1600" dirty="0">
-              <a:solidFill>
-                <a:srgbClr val="FFFF00"/>
-              </a:solidFill>
-              <a:latin typeface="Avenir Black"/>
-              <a:cs typeface="Avenir Black"/>
-            </a:endParaRPr>
-          </a:p>
-        </p:txBody>
-      </p:sp>
     </p:spTree>
     <p:extLst>
       <p:ext uri="{BB962C8B-B14F-4D97-AF65-F5344CB8AC3E}">
-        <p14:creationId xmlns:p14="http://schemas.microsoft.com/office/powerpoint/2010/main" val="1689008741"/>
+        <p14:creationId xmlns:p14="http://schemas.microsoft.com/office/powerpoint/2010/main" val="982410486"/>
       </p:ext>
     </p:extLst>
   </p:cSld>
@@ -5815,6 +5794,2051 @@
                 <a:latin typeface="Avenir Black"/>
                 <a:cs typeface="Avenir Black"/>
               </a:rPr>
+              <a:t>PLAY AGAIN</a:t>
+            </a:r>
+            <a:endParaRPr lang="en-US" sz="1600" dirty="0">
+              <a:solidFill>
+                <a:srgbClr val="FFFF00"/>
+              </a:solidFill>
+              <a:latin typeface="Avenir Black"/>
+              <a:cs typeface="Avenir Black"/>
+            </a:endParaRPr>
+          </a:p>
+        </p:txBody>
+      </p:sp>
+      <p:sp>
+        <p:nvSpPr>
+          <p:cNvPr id="18" name="TextBox 17"/>
+          <p:cNvSpPr txBox="1"/>
+          <p:nvPr/>
+        </p:nvSpPr>
+        <p:spPr>
+          <a:xfrm>
+            <a:off x="3209688" y="2972193"/>
+            <a:ext cx="1774630" cy="648480"/>
+          </a:xfrm>
+          <a:prstGeom prst="rect">
+            <a:avLst/>
+          </a:prstGeom>
+          <a:noFill/>
+        </p:spPr>
+        <p:txBody>
+          <a:bodyPr wrap="square" rtlCol="0">
+            <a:prstTxWarp prst="textCanDown">
+              <a:avLst>
+                <a:gd name="adj" fmla="val 4887"/>
+              </a:avLst>
+            </a:prstTxWarp>
+            <a:spAutoFit/>
+          </a:bodyPr>
+          <a:lstStyle/>
+          <a:p>
+            <a:pPr algn="ctr"/>
+            <a:r>
+              <a:rPr lang="en-US" sz="1600" dirty="0" smtClean="0">
+                <a:solidFill>
+                  <a:srgbClr val="FF0000"/>
+                </a:solidFill>
+                <a:latin typeface="Avenir Black"/>
+                <a:cs typeface="Avenir Black"/>
+              </a:rPr>
+              <a:t>Blackjack!</a:t>
+            </a:r>
+            <a:endParaRPr lang="en-US" sz="1600" dirty="0">
+              <a:solidFill>
+                <a:srgbClr val="FF0000"/>
+              </a:solidFill>
+              <a:latin typeface="Avenir Black"/>
+              <a:cs typeface="Avenir Black"/>
+            </a:endParaRPr>
+          </a:p>
+        </p:txBody>
+      </p:sp>
+    </p:spTree>
+    <p:extLst>
+      <p:ext uri="{BB962C8B-B14F-4D97-AF65-F5344CB8AC3E}">
+        <p14:creationId xmlns:p14="http://schemas.microsoft.com/office/powerpoint/2010/main" val="2890052291"/>
+      </p:ext>
+    </p:extLst>
+  </p:cSld>
+  <p:clrMapOvr>
+    <a:masterClrMapping/>
+  </p:clrMapOvr>
+</p:sld>
+</file>
+
+<file path=ppt/slides/slide5.xml><?xml version="1.0" encoding="utf-8"?>
+<p:sld xmlns:a="http://schemas.openxmlformats.org/drawingml/2006/main" xmlns:r="http://schemas.openxmlformats.org/officeDocument/2006/relationships" xmlns:p="http://schemas.openxmlformats.org/presentationml/2006/main">
+  <p:cSld>
+    <p:spTree>
+      <p:nvGrpSpPr>
+        <p:cNvPr id="1" name=""/>
+        <p:cNvGrpSpPr/>
+        <p:nvPr/>
+      </p:nvGrpSpPr>
+      <p:grpSpPr>
+        <a:xfrm>
+          <a:off x="0" y="0"/>
+          <a:ext cx="0" cy="0"/>
+          <a:chOff x="0" y="0"/>
+          <a:chExt cx="0" cy="0"/>
+        </a:xfrm>
+      </p:grpSpPr>
+      <p:sp>
+        <p:nvSpPr>
+          <p:cNvPr id="4" name="Rectangle 3"/>
+          <p:cNvSpPr/>
+          <p:nvPr/>
+        </p:nvSpPr>
+        <p:spPr>
+          <a:xfrm>
+            <a:off x="2642567" y="1577494"/>
+            <a:ext cx="2908873" cy="4363716"/>
+          </a:xfrm>
+          <a:prstGeom prst="rect">
+            <a:avLst/>
+          </a:prstGeom>
+          <a:gradFill>
+            <a:gsLst>
+              <a:gs pos="0">
+                <a:srgbClr val="008000"/>
+              </a:gs>
+              <a:gs pos="86000">
+                <a:schemeClr val="accent3">
+                  <a:lumMod val="60000"/>
+                  <a:lumOff val="40000"/>
+                </a:schemeClr>
+              </a:gs>
+            </a:gsLst>
+            <a:lin ang="16740000" scaled="0"/>
+          </a:gradFill>
+          <a:ln>
+            <a:solidFill>
+              <a:schemeClr val="tx1"/>
+            </a:solidFill>
+          </a:ln>
+          <a:effectLst/>
+        </p:spPr>
+        <p:style>
+          <a:lnRef idx="1">
+            <a:schemeClr val="accent1"/>
+          </a:lnRef>
+          <a:fillRef idx="3">
+            <a:schemeClr val="accent1"/>
+          </a:fillRef>
+          <a:effectRef idx="2">
+            <a:schemeClr val="accent1"/>
+          </a:effectRef>
+          <a:fontRef idx="minor">
+            <a:schemeClr val="lt1"/>
+          </a:fontRef>
+        </p:style>
+        <p:txBody>
+          <a:bodyPr rtlCol="0" anchor="ctr"/>
+          <a:lstStyle/>
+          <a:p>
+            <a:pPr algn="ctr"/>
+            <a:endParaRPr lang="en-US" dirty="0"/>
+          </a:p>
+        </p:txBody>
+      </p:sp>
+      <p:pic>
+        <p:nvPicPr>
+          <p:cNvPr id="19" name="Picture 18" descr="Poker-Chips-psd31581.png"/>
+          <p:cNvPicPr>
+            <a:picLocks noChangeAspect="1"/>
+          </p:cNvPicPr>
+          <p:nvPr/>
+        </p:nvPicPr>
+        <p:blipFill>
+          <a:blip r:embed="rId2">
+            <a:extLst>
+              <a:ext uri="{28A0092B-C50C-407E-A947-70E740481C1C}">
+                <a14:useLocalDpi xmlns:a14="http://schemas.microsoft.com/office/drawing/2010/main" val="0"/>
+              </a:ext>
+            </a:extLst>
+          </a:blip>
+          <a:stretch>
+            <a:fillRect/>
+          </a:stretch>
+        </p:blipFill>
+        <p:spPr>
+          <a:xfrm>
+            <a:off x="2823934" y="1751129"/>
+            <a:ext cx="721830" cy="626188"/>
+          </a:xfrm>
+          <a:prstGeom prst="rect">
+            <a:avLst/>
+          </a:prstGeom>
+        </p:spPr>
+      </p:pic>
+      <p:pic>
+        <p:nvPicPr>
+          <p:cNvPr id="20" name="Picture 19" descr="Poker-Chips-psd31581.png"/>
+          <p:cNvPicPr>
+            <a:picLocks noChangeAspect="1"/>
+          </p:cNvPicPr>
+          <p:nvPr/>
+        </p:nvPicPr>
+        <p:blipFill>
+          <a:blip r:embed="rId2">
+            <a:extLst>
+              <a:ext uri="{28A0092B-C50C-407E-A947-70E740481C1C}">
+                <a14:useLocalDpi xmlns:a14="http://schemas.microsoft.com/office/drawing/2010/main" val="0"/>
+              </a:ext>
+            </a:extLst>
+          </a:blip>
+          <a:stretch>
+            <a:fillRect/>
+          </a:stretch>
+        </p:blipFill>
+        <p:spPr>
+          <a:xfrm>
+            <a:off x="3063117" y="1645044"/>
+            <a:ext cx="721830" cy="626188"/>
+          </a:xfrm>
+          <a:prstGeom prst="rect">
+            <a:avLst/>
+          </a:prstGeom>
+        </p:spPr>
+      </p:pic>
+      <p:pic>
+        <p:nvPicPr>
+          <p:cNvPr id="21" name="Picture 20" descr="Poker-Chips-psd31581.png"/>
+          <p:cNvPicPr>
+            <a:picLocks noChangeAspect="1"/>
+          </p:cNvPicPr>
+          <p:nvPr/>
+        </p:nvPicPr>
+        <p:blipFill>
+          <a:blip r:embed="rId2">
+            <a:extLst>
+              <a:ext uri="{28A0092B-C50C-407E-A947-70E740481C1C}">
+                <a14:useLocalDpi xmlns:a14="http://schemas.microsoft.com/office/drawing/2010/main" val="0"/>
+              </a:ext>
+            </a:extLst>
+          </a:blip>
+          <a:stretch>
+            <a:fillRect/>
+          </a:stretch>
+        </p:blipFill>
+        <p:spPr>
+          <a:xfrm>
+            <a:off x="3198237" y="1805169"/>
+            <a:ext cx="721830" cy="626188"/>
+          </a:xfrm>
+          <a:prstGeom prst="rect">
+            <a:avLst/>
+          </a:prstGeom>
+        </p:spPr>
+      </p:pic>
+      <p:sp>
+        <p:nvSpPr>
+          <p:cNvPr id="22" name="Rectangle 21"/>
+          <p:cNvSpPr/>
+          <p:nvPr/>
+        </p:nvSpPr>
+        <p:spPr>
+          <a:xfrm>
+            <a:off x="2642567" y="4958160"/>
+            <a:ext cx="2908873" cy="324240"/>
+          </a:xfrm>
+          <a:prstGeom prst="rect">
+            <a:avLst/>
+          </a:prstGeom>
+          <a:solidFill>
+            <a:srgbClr val="FFFFFF"/>
+          </a:solidFill>
+          <a:ln>
+            <a:solidFill>
+              <a:srgbClr val="000000"/>
+            </a:solidFill>
+          </a:ln>
+          <a:effectLst/>
+        </p:spPr>
+        <p:style>
+          <a:lnRef idx="1">
+            <a:schemeClr val="accent1"/>
+          </a:lnRef>
+          <a:fillRef idx="3">
+            <a:schemeClr val="accent1"/>
+          </a:fillRef>
+          <a:effectRef idx="2">
+            <a:schemeClr val="accent1"/>
+          </a:effectRef>
+          <a:fontRef idx="minor">
+            <a:schemeClr val="lt1"/>
+          </a:fontRef>
+        </p:style>
+        <p:txBody>
+          <a:bodyPr rtlCol="0" anchor="ctr"/>
+          <a:lstStyle/>
+          <a:p>
+            <a:pPr algn="ctr"/>
+            <a:endParaRPr lang="en-US"/>
+          </a:p>
+        </p:txBody>
+      </p:sp>
+      <p:sp>
+        <p:nvSpPr>
+          <p:cNvPr id="23" name="Rectangle 22"/>
+          <p:cNvSpPr/>
+          <p:nvPr/>
+        </p:nvSpPr>
+        <p:spPr>
+          <a:xfrm>
+            <a:off x="2642567" y="5282400"/>
+            <a:ext cx="2908873" cy="658810"/>
+          </a:xfrm>
+          <a:prstGeom prst="rect">
+            <a:avLst/>
+          </a:prstGeom>
+          <a:gradFill flip="none" rotWithShape="1">
+            <a:gsLst>
+              <a:gs pos="0">
+                <a:schemeClr val="accent6"/>
+              </a:gs>
+              <a:gs pos="100000">
+                <a:schemeClr val="accent6">
+                  <a:lumMod val="60000"/>
+                  <a:lumOff val="40000"/>
+                </a:schemeClr>
+              </a:gs>
+            </a:gsLst>
+            <a:lin ang="16200000" scaled="0"/>
+            <a:tileRect/>
+          </a:gradFill>
+          <a:ln>
+            <a:solidFill>
+              <a:srgbClr val="000000"/>
+            </a:solidFill>
+          </a:ln>
+          <a:effectLst/>
+        </p:spPr>
+        <p:style>
+          <a:lnRef idx="1">
+            <a:schemeClr val="accent1"/>
+          </a:lnRef>
+          <a:fillRef idx="3">
+            <a:schemeClr val="accent1"/>
+          </a:fillRef>
+          <a:effectRef idx="2">
+            <a:schemeClr val="accent1"/>
+          </a:effectRef>
+          <a:fontRef idx="minor">
+            <a:schemeClr val="lt1"/>
+          </a:fontRef>
+        </p:style>
+        <p:txBody>
+          <a:bodyPr rtlCol="0" anchor="ctr"/>
+          <a:lstStyle/>
+          <a:p>
+            <a:pPr algn="ctr"/>
+            <a:endParaRPr lang="en-US"/>
+          </a:p>
+        </p:txBody>
+      </p:sp>
+      <p:cxnSp>
+        <p:nvCxnSpPr>
+          <p:cNvPr id="26" name="Straight Connector 25"/>
+          <p:cNvCxnSpPr/>
+          <p:nvPr/>
+        </p:nvCxnSpPr>
+        <p:spPr>
+          <a:xfrm>
+            <a:off x="3224342" y="5282400"/>
+            <a:ext cx="0" cy="658810"/>
+          </a:xfrm>
+          <a:prstGeom prst="line">
+            <a:avLst/>
+          </a:prstGeom>
+          <a:ln>
+            <a:solidFill>
+              <a:srgbClr val="000000"/>
+            </a:solidFill>
+          </a:ln>
+          <a:effectLst/>
+        </p:spPr>
+        <p:style>
+          <a:lnRef idx="2">
+            <a:schemeClr val="accent1"/>
+          </a:lnRef>
+          <a:fillRef idx="0">
+            <a:schemeClr val="accent1"/>
+          </a:fillRef>
+          <a:effectRef idx="1">
+            <a:schemeClr val="accent1"/>
+          </a:effectRef>
+          <a:fontRef idx="minor">
+            <a:schemeClr val="tx1"/>
+          </a:fontRef>
+        </p:style>
+      </p:cxnSp>
+      <p:cxnSp>
+        <p:nvCxnSpPr>
+          <p:cNvPr id="28" name="Straight Connector 27"/>
+          <p:cNvCxnSpPr/>
+          <p:nvPr/>
+        </p:nvCxnSpPr>
+        <p:spPr>
+          <a:xfrm>
+            <a:off x="3806117" y="5282400"/>
+            <a:ext cx="0" cy="658810"/>
+          </a:xfrm>
+          <a:prstGeom prst="line">
+            <a:avLst/>
+          </a:prstGeom>
+          <a:ln>
+            <a:solidFill>
+              <a:srgbClr val="000000"/>
+            </a:solidFill>
+          </a:ln>
+          <a:effectLst/>
+        </p:spPr>
+        <p:style>
+          <a:lnRef idx="2">
+            <a:schemeClr val="accent1"/>
+          </a:lnRef>
+          <a:fillRef idx="0">
+            <a:schemeClr val="accent1"/>
+          </a:fillRef>
+          <a:effectRef idx="1">
+            <a:schemeClr val="accent1"/>
+          </a:effectRef>
+          <a:fontRef idx="minor">
+            <a:schemeClr val="tx1"/>
+          </a:fontRef>
+        </p:style>
+      </p:cxnSp>
+      <p:cxnSp>
+        <p:nvCxnSpPr>
+          <p:cNvPr id="29" name="Straight Connector 28"/>
+          <p:cNvCxnSpPr/>
+          <p:nvPr/>
+        </p:nvCxnSpPr>
+        <p:spPr>
+          <a:xfrm>
+            <a:off x="4387892" y="5282400"/>
+            <a:ext cx="0" cy="658810"/>
+          </a:xfrm>
+          <a:prstGeom prst="line">
+            <a:avLst/>
+          </a:prstGeom>
+          <a:ln>
+            <a:solidFill>
+              <a:srgbClr val="000000"/>
+            </a:solidFill>
+          </a:ln>
+          <a:effectLst/>
+        </p:spPr>
+        <p:style>
+          <a:lnRef idx="2">
+            <a:schemeClr val="accent1"/>
+          </a:lnRef>
+          <a:fillRef idx="0">
+            <a:schemeClr val="accent1"/>
+          </a:fillRef>
+          <a:effectRef idx="1">
+            <a:schemeClr val="accent1"/>
+          </a:effectRef>
+          <a:fontRef idx="minor">
+            <a:schemeClr val="tx1"/>
+          </a:fontRef>
+        </p:style>
+      </p:cxnSp>
+      <p:cxnSp>
+        <p:nvCxnSpPr>
+          <p:cNvPr id="30" name="Straight Connector 29"/>
+          <p:cNvCxnSpPr/>
+          <p:nvPr/>
+        </p:nvCxnSpPr>
+        <p:spPr>
+          <a:xfrm>
+            <a:off x="4969667" y="5282400"/>
+            <a:ext cx="0" cy="658810"/>
+          </a:xfrm>
+          <a:prstGeom prst="line">
+            <a:avLst/>
+          </a:prstGeom>
+          <a:ln>
+            <a:solidFill>
+              <a:srgbClr val="000000"/>
+            </a:solidFill>
+          </a:ln>
+          <a:effectLst/>
+        </p:spPr>
+        <p:style>
+          <a:lnRef idx="2">
+            <a:schemeClr val="accent1"/>
+          </a:lnRef>
+          <a:fillRef idx="0">
+            <a:schemeClr val="accent1"/>
+          </a:fillRef>
+          <a:effectRef idx="1">
+            <a:schemeClr val="accent1"/>
+          </a:effectRef>
+          <a:fontRef idx="minor">
+            <a:schemeClr val="tx1"/>
+          </a:fontRef>
+        </p:style>
+      </p:cxnSp>
+      <p:sp>
+        <p:nvSpPr>
+          <p:cNvPr id="33" name="TextBox 32"/>
+          <p:cNvSpPr txBox="1"/>
+          <p:nvPr/>
+        </p:nvSpPr>
+        <p:spPr>
+          <a:xfrm>
+            <a:off x="2656079" y="5434799"/>
+            <a:ext cx="535648" cy="369332"/>
+          </a:xfrm>
+          <a:prstGeom prst="rect">
+            <a:avLst/>
+          </a:prstGeom>
+          <a:noFill/>
+        </p:spPr>
+        <p:txBody>
+          <a:bodyPr wrap="none" rtlCol="0">
+            <a:spAutoFit/>
+          </a:bodyPr>
+          <a:lstStyle/>
+          <a:p>
+            <a:r>
+              <a:rPr lang="en-US" dirty="0" smtClean="0"/>
+              <a:t>$25</a:t>
+            </a:r>
+            <a:endParaRPr lang="en-US" dirty="0"/>
+          </a:p>
+        </p:txBody>
+      </p:sp>
+      <p:sp>
+        <p:nvSpPr>
+          <p:cNvPr id="34" name="TextBox 33"/>
+          <p:cNvSpPr txBox="1"/>
+          <p:nvPr/>
+        </p:nvSpPr>
+        <p:spPr>
+          <a:xfrm>
+            <a:off x="3222275" y="5434799"/>
+            <a:ext cx="535648" cy="369332"/>
+          </a:xfrm>
+          <a:prstGeom prst="rect">
+            <a:avLst/>
+          </a:prstGeom>
+          <a:noFill/>
+        </p:spPr>
+        <p:txBody>
+          <a:bodyPr wrap="none" rtlCol="0">
+            <a:spAutoFit/>
+          </a:bodyPr>
+          <a:lstStyle/>
+          <a:p>
+            <a:r>
+              <a:rPr lang="en-US" dirty="0" smtClean="0"/>
+              <a:t>$50</a:t>
+            </a:r>
+            <a:endParaRPr lang="en-US" dirty="0"/>
+          </a:p>
+        </p:txBody>
+      </p:sp>
+      <p:sp>
+        <p:nvSpPr>
+          <p:cNvPr id="35" name="TextBox 34"/>
+          <p:cNvSpPr txBox="1"/>
+          <p:nvPr/>
+        </p:nvSpPr>
+        <p:spPr>
+          <a:xfrm>
+            <a:off x="3753758" y="5434799"/>
+            <a:ext cx="652643" cy="369332"/>
+          </a:xfrm>
+          <a:prstGeom prst="rect">
+            <a:avLst/>
+          </a:prstGeom>
+          <a:noFill/>
+        </p:spPr>
+        <p:txBody>
+          <a:bodyPr wrap="none" rtlCol="0">
+            <a:spAutoFit/>
+          </a:bodyPr>
+          <a:lstStyle/>
+          <a:p>
+            <a:r>
+              <a:rPr lang="en-US" dirty="0" smtClean="0"/>
+              <a:t>$100</a:t>
+            </a:r>
+            <a:endParaRPr lang="en-US" dirty="0"/>
+          </a:p>
+        </p:txBody>
+      </p:sp>
+      <p:sp>
+        <p:nvSpPr>
+          <p:cNvPr id="36" name="TextBox 35"/>
+          <p:cNvSpPr txBox="1"/>
+          <p:nvPr/>
+        </p:nvSpPr>
+        <p:spPr>
+          <a:xfrm>
+            <a:off x="4335454" y="5434799"/>
+            <a:ext cx="652643" cy="369332"/>
+          </a:xfrm>
+          <a:prstGeom prst="rect">
+            <a:avLst/>
+          </a:prstGeom>
+          <a:noFill/>
+        </p:spPr>
+        <p:txBody>
+          <a:bodyPr wrap="none" rtlCol="0">
+            <a:spAutoFit/>
+          </a:bodyPr>
+          <a:lstStyle/>
+          <a:p>
+            <a:r>
+              <a:rPr lang="en-US" dirty="0" smtClean="0"/>
+              <a:t>$250</a:t>
+            </a:r>
+            <a:endParaRPr lang="en-US" dirty="0"/>
+          </a:p>
+        </p:txBody>
+      </p:sp>
+      <p:sp>
+        <p:nvSpPr>
+          <p:cNvPr id="37" name="TextBox 36"/>
+          <p:cNvSpPr txBox="1"/>
+          <p:nvPr/>
+        </p:nvSpPr>
+        <p:spPr>
+          <a:xfrm>
+            <a:off x="4966357" y="5434799"/>
+            <a:ext cx="538579" cy="369332"/>
+          </a:xfrm>
+          <a:prstGeom prst="rect">
+            <a:avLst/>
+          </a:prstGeom>
+          <a:noFill/>
+        </p:spPr>
+        <p:txBody>
+          <a:bodyPr wrap="none" rtlCol="0">
+            <a:spAutoFit/>
+          </a:bodyPr>
+          <a:lstStyle/>
+          <a:p>
+            <a:r>
+              <a:rPr lang="en-US" dirty="0" smtClean="0"/>
+              <a:t>$1K</a:t>
+            </a:r>
+            <a:endParaRPr lang="en-US" dirty="0"/>
+          </a:p>
+        </p:txBody>
+      </p:sp>
+      <p:sp>
+        <p:nvSpPr>
+          <p:cNvPr id="24" name="TextBox 23"/>
+          <p:cNvSpPr txBox="1"/>
+          <p:nvPr/>
+        </p:nvSpPr>
+        <p:spPr>
+          <a:xfrm>
+            <a:off x="3218751" y="4552860"/>
+            <a:ext cx="1774630" cy="364770"/>
+          </a:xfrm>
+          <a:prstGeom prst="rect">
+            <a:avLst/>
+          </a:prstGeom>
+          <a:noFill/>
+        </p:spPr>
+        <p:txBody>
+          <a:bodyPr wrap="square" rtlCol="0">
+            <a:prstTxWarp prst="textCanDown">
+              <a:avLst>
+                <a:gd name="adj" fmla="val 8733"/>
+              </a:avLst>
+            </a:prstTxWarp>
+            <a:spAutoFit/>
+          </a:bodyPr>
+          <a:lstStyle/>
+          <a:p>
+            <a:pPr algn="ctr"/>
+            <a:r>
+              <a:rPr lang="en-US" sz="1600" dirty="0" smtClean="0">
+                <a:solidFill>
+                  <a:srgbClr val="FFFF00"/>
+                </a:solidFill>
+                <a:latin typeface="Avenir Black"/>
+                <a:cs typeface="Avenir Black"/>
+              </a:rPr>
+              <a:t>PLAY AGAIN</a:t>
+            </a:r>
+            <a:endParaRPr lang="en-US" sz="1600" dirty="0">
+              <a:solidFill>
+                <a:srgbClr val="FFFF00"/>
+              </a:solidFill>
+              <a:latin typeface="Avenir Black"/>
+              <a:cs typeface="Avenir Black"/>
+            </a:endParaRPr>
+          </a:p>
+        </p:txBody>
+      </p:sp>
+      <p:sp>
+        <p:nvSpPr>
+          <p:cNvPr id="18" name="TextBox 17"/>
+          <p:cNvSpPr txBox="1"/>
+          <p:nvPr/>
+        </p:nvSpPr>
+        <p:spPr>
+          <a:xfrm>
+            <a:off x="3209688" y="2945173"/>
+            <a:ext cx="1774630" cy="661990"/>
+          </a:xfrm>
+          <a:prstGeom prst="rect">
+            <a:avLst/>
+          </a:prstGeom>
+          <a:noFill/>
+        </p:spPr>
+        <p:txBody>
+          <a:bodyPr wrap="square" rtlCol="0">
+            <a:prstTxWarp prst="textCanDown">
+              <a:avLst>
+                <a:gd name="adj" fmla="val 4887"/>
+              </a:avLst>
+            </a:prstTxWarp>
+            <a:spAutoFit/>
+          </a:bodyPr>
+          <a:lstStyle/>
+          <a:p>
+            <a:pPr algn="ctr"/>
+            <a:r>
+              <a:rPr lang="en-US" sz="1600" dirty="0" smtClean="0">
+                <a:solidFill>
+                  <a:srgbClr val="FF0000"/>
+                </a:solidFill>
+                <a:latin typeface="Avenir Black"/>
+                <a:cs typeface="Avenir Black"/>
+              </a:rPr>
+              <a:t>WINNER!</a:t>
+            </a:r>
+            <a:endParaRPr lang="en-US" sz="1600" dirty="0">
+              <a:solidFill>
+                <a:srgbClr val="FF0000"/>
+              </a:solidFill>
+              <a:latin typeface="Avenir Black"/>
+              <a:cs typeface="Avenir Black"/>
+            </a:endParaRPr>
+          </a:p>
+        </p:txBody>
+      </p:sp>
+    </p:spTree>
+    <p:extLst>
+      <p:ext uri="{BB962C8B-B14F-4D97-AF65-F5344CB8AC3E}">
+        <p14:creationId xmlns:p14="http://schemas.microsoft.com/office/powerpoint/2010/main" val="982410486"/>
+      </p:ext>
+    </p:extLst>
+  </p:cSld>
+  <p:clrMapOvr>
+    <a:masterClrMapping/>
+  </p:clrMapOvr>
+</p:sld>
+</file>
+
+<file path=ppt/slides/slide6.xml><?xml version="1.0" encoding="utf-8"?>
+<p:sld xmlns:a="http://schemas.openxmlformats.org/drawingml/2006/main" xmlns:r="http://schemas.openxmlformats.org/officeDocument/2006/relationships" xmlns:p="http://schemas.openxmlformats.org/presentationml/2006/main">
+  <p:cSld>
+    <p:spTree>
+      <p:nvGrpSpPr>
+        <p:cNvPr id="1" name=""/>
+        <p:cNvGrpSpPr/>
+        <p:nvPr/>
+      </p:nvGrpSpPr>
+      <p:grpSpPr>
+        <a:xfrm>
+          <a:off x="0" y="0"/>
+          <a:ext cx="0" cy="0"/>
+          <a:chOff x="0" y="0"/>
+          <a:chExt cx="0" cy="0"/>
+        </a:xfrm>
+      </p:grpSpPr>
+      <p:sp>
+        <p:nvSpPr>
+          <p:cNvPr id="4" name="Rectangle 3"/>
+          <p:cNvSpPr/>
+          <p:nvPr/>
+        </p:nvSpPr>
+        <p:spPr>
+          <a:xfrm>
+            <a:off x="2642567" y="1577494"/>
+            <a:ext cx="2908873" cy="4363716"/>
+          </a:xfrm>
+          <a:prstGeom prst="rect">
+            <a:avLst/>
+          </a:prstGeom>
+          <a:gradFill>
+            <a:gsLst>
+              <a:gs pos="0">
+                <a:srgbClr val="008000"/>
+              </a:gs>
+              <a:gs pos="86000">
+                <a:schemeClr val="accent3">
+                  <a:lumMod val="60000"/>
+                  <a:lumOff val="40000"/>
+                </a:schemeClr>
+              </a:gs>
+            </a:gsLst>
+            <a:lin ang="16740000" scaled="0"/>
+          </a:gradFill>
+          <a:ln>
+            <a:solidFill>
+              <a:schemeClr val="tx1"/>
+            </a:solidFill>
+          </a:ln>
+          <a:effectLst/>
+        </p:spPr>
+        <p:style>
+          <a:lnRef idx="1">
+            <a:schemeClr val="accent1"/>
+          </a:lnRef>
+          <a:fillRef idx="3">
+            <a:schemeClr val="accent1"/>
+          </a:fillRef>
+          <a:effectRef idx="2">
+            <a:schemeClr val="accent1"/>
+          </a:effectRef>
+          <a:fontRef idx="minor">
+            <a:schemeClr val="lt1"/>
+          </a:fontRef>
+        </p:style>
+        <p:txBody>
+          <a:bodyPr rtlCol="0" anchor="ctr"/>
+          <a:lstStyle/>
+          <a:p>
+            <a:pPr algn="ctr"/>
+            <a:endParaRPr lang="en-US" dirty="0"/>
+          </a:p>
+        </p:txBody>
+      </p:sp>
+      <p:pic>
+        <p:nvPicPr>
+          <p:cNvPr id="19" name="Picture 18" descr="Poker-Chips-psd31581.png"/>
+          <p:cNvPicPr>
+            <a:picLocks noChangeAspect="1"/>
+          </p:cNvPicPr>
+          <p:nvPr/>
+        </p:nvPicPr>
+        <p:blipFill>
+          <a:blip r:embed="rId2">
+            <a:extLst>
+              <a:ext uri="{28A0092B-C50C-407E-A947-70E740481C1C}">
+                <a14:useLocalDpi xmlns:a14="http://schemas.microsoft.com/office/drawing/2010/main" val="0"/>
+              </a:ext>
+            </a:extLst>
+          </a:blip>
+          <a:stretch>
+            <a:fillRect/>
+          </a:stretch>
+        </p:blipFill>
+        <p:spPr>
+          <a:xfrm>
+            <a:off x="2823934" y="1751129"/>
+            <a:ext cx="721830" cy="626188"/>
+          </a:xfrm>
+          <a:prstGeom prst="rect">
+            <a:avLst/>
+          </a:prstGeom>
+        </p:spPr>
+      </p:pic>
+      <p:pic>
+        <p:nvPicPr>
+          <p:cNvPr id="20" name="Picture 19" descr="Poker-Chips-psd31581.png"/>
+          <p:cNvPicPr>
+            <a:picLocks noChangeAspect="1"/>
+          </p:cNvPicPr>
+          <p:nvPr/>
+        </p:nvPicPr>
+        <p:blipFill>
+          <a:blip r:embed="rId2">
+            <a:extLst>
+              <a:ext uri="{28A0092B-C50C-407E-A947-70E740481C1C}">
+                <a14:useLocalDpi xmlns:a14="http://schemas.microsoft.com/office/drawing/2010/main" val="0"/>
+              </a:ext>
+            </a:extLst>
+          </a:blip>
+          <a:stretch>
+            <a:fillRect/>
+          </a:stretch>
+        </p:blipFill>
+        <p:spPr>
+          <a:xfrm>
+            <a:off x="3063117" y="1645044"/>
+            <a:ext cx="721830" cy="626188"/>
+          </a:xfrm>
+          <a:prstGeom prst="rect">
+            <a:avLst/>
+          </a:prstGeom>
+        </p:spPr>
+      </p:pic>
+      <p:pic>
+        <p:nvPicPr>
+          <p:cNvPr id="21" name="Picture 20" descr="Poker-Chips-psd31581.png"/>
+          <p:cNvPicPr>
+            <a:picLocks noChangeAspect="1"/>
+          </p:cNvPicPr>
+          <p:nvPr/>
+        </p:nvPicPr>
+        <p:blipFill>
+          <a:blip r:embed="rId2">
+            <a:extLst>
+              <a:ext uri="{28A0092B-C50C-407E-A947-70E740481C1C}">
+                <a14:useLocalDpi xmlns:a14="http://schemas.microsoft.com/office/drawing/2010/main" val="0"/>
+              </a:ext>
+            </a:extLst>
+          </a:blip>
+          <a:stretch>
+            <a:fillRect/>
+          </a:stretch>
+        </p:blipFill>
+        <p:spPr>
+          <a:xfrm>
+            <a:off x="3198237" y="1805169"/>
+            <a:ext cx="721830" cy="626188"/>
+          </a:xfrm>
+          <a:prstGeom prst="rect">
+            <a:avLst/>
+          </a:prstGeom>
+        </p:spPr>
+      </p:pic>
+      <p:sp>
+        <p:nvSpPr>
+          <p:cNvPr id="22" name="Rectangle 21"/>
+          <p:cNvSpPr/>
+          <p:nvPr/>
+        </p:nvSpPr>
+        <p:spPr>
+          <a:xfrm>
+            <a:off x="2642567" y="4958160"/>
+            <a:ext cx="2908873" cy="324240"/>
+          </a:xfrm>
+          <a:prstGeom prst="rect">
+            <a:avLst/>
+          </a:prstGeom>
+          <a:solidFill>
+            <a:srgbClr val="FFFFFF"/>
+          </a:solidFill>
+          <a:ln>
+            <a:solidFill>
+              <a:srgbClr val="000000"/>
+            </a:solidFill>
+          </a:ln>
+          <a:effectLst/>
+        </p:spPr>
+        <p:style>
+          <a:lnRef idx="1">
+            <a:schemeClr val="accent1"/>
+          </a:lnRef>
+          <a:fillRef idx="3">
+            <a:schemeClr val="accent1"/>
+          </a:fillRef>
+          <a:effectRef idx="2">
+            <a:schemeClr val="accent1"/>
+          </a:effectRef>
+          <a:fontRef idx="minor">
+            <a:schemeClr val="lt1"/>
+          </a:fontRef>
+        </p:style>
+        <p:txBody>
+          <a:bodyPr rtlCol="0" anchor="ctr"/>
+          <a:lstStyle/>
+          <a:p>
+            <a:pPr algn="ctr"/>
+            <a:endParaRPr lang="en-US"/>
+          </a:p>
+        </p:txBody>
+      </p:sp>
+      <p:sp>
+        <p:nvSpPr>
+          <p:cNvPr id="23" name="Rectangle 22"/>
+          <p:cNvSpPr/>
+          <p:nvPr/>
+        </p:nvSpPr>
+        <p:spPr>
+          <a:xfrm>
+            <a:off x="2642567" y="5282400"/>
+            <a:ext cx="2908873" cy="658810"/>
+          </a:xfrm>
+          <a:prstGeom prst="rect">
+            <a:avLst/>
+          </a:prstGeom>
+          <a:gradFill flip="none" rotWithShape="1">
+            <a:gsLst>
+              <a:gs pos="0">
+                <a:schemeClr val="accent6"/>
+              </a:gs>
+              <a:gs pos="100000">
+                <a:schemeClr val="accent6">
+                  <a:lumMod val="60000"/>
+                  <a:lumOff val="40000"/>
+                </a:schemeClr>
+              </a:gs>
+            </a:gsLst>
+            <a:lin ang="16200000" scaled="0"/>
+            <a:tileRect/>
+          </a:gradFill>
+          <a:ln>
+            <a:solidFill>
+              <a:srgbClr val="000000"/>
+            </a:solidFill>
+          </a:ln>
+          <a:effectLst/>
+        </p:spPr>
+        <p:style>
+          <a:lnRef idx="1">
+            <a:schemeClr val="accent1"/>
+          </a:lnRef>
+          <a:fillRef idx="3">
+            <a:schemeClr val="accent1"/>
+          </a:fillRef>
+          <a:effectRef idx="2">
+            <a:schemeClr val="accent1"/>
+          </a:effectRef>
+          <a:fontRef idx="minor">
+            <a:schemeClr val="lt1"/>
+          </a:fontRef>
+        </p:style>
+        <p:txBody>
+          <a:bodyPr rtlCol="0" anchor="ctr"/>
+          <a:lstStyle/>
+          <a:p>
+            <a:pPr algn="ctr"/>
+            <a:endParaRPr lang="en-US"/>
+          </a:p>
+        </p:txBody>
+      </p:sp>
+      <p:cxnSp>
+        <p:nvCxnSpPr>
+          <p:cNvPr id="26" name="Straight Connector 25"/>
+          <p:cNvCxnSpPr/>
+          <p:nvPr/>
+        </p:nvCxnSpPr>
+        <p:spPr>
+          <a:xfrm>
+            <a:off x="3224342" y="5282400"/>
+            <a:ext cx="0" cy="658810"/>
+          </a:xfrm>
+          <a:prstGeom prst="line">
+            <a:avLst/>
+          </a:prstGeom>
+          <a:ln>
+            <a:solidFill>
+              <a:srgbClr val="000000"/>
+            </a:solidFill>
+          </a:ln>
+          <a:effectLst/>
+        </p:spPr>
+        <p:style>
+          <a:lnRef idx="2">
+            <a:schemeClr val="accent1"/>
+          </a:lnRef>
+          <a:fillRef idx="0">
+            <a:schemeClr val="accent1"/>
+          </a:fillRef>
+          <a:effectRef idx="1">
+            <a:schemeClr val="accent1"/>
+          </a:effectRef>
+          <a:fontRef idx="minor">
+            <a:schemeClr val="tx1"/>
+          </a:fontRef>
+        </p:style>
+      </p:cxnSp>
+      <p:cxnSp>
+        <p:nvCxnSpPr>
+          <p:cNvPr id="28" name="Straight Connector 27"/>
+          <p:cNvCxnSpPr/>
+          <p:nvPr/>
+        </p:nvCxnSpPr>
+        <p:spPr>
+          <a:xfrm>
+            <a:off x="3806117" y="5282400"/>
+            <a:ext cx="0" cy="658810"/>
+          </a:xfrm>
+          <a:prstGeom prst="line">
+            <a:avLst/>
+          </a:prstGeom>
+          <a:ln>
+            <a:solidFill>
+              <a:srgbClr val="000000"/>
+            </a:solidFill>
+          </a:ln>
+          <a:effectLst/>
+        </p:spPr>
+        <p:style>
+          <a:lnRef idx="2">
+            <a:schemeClr val="accent1"/>
+          </a:lnRef>
+          <a:fillRef idx="0">
+            <a:schemeClr val="accent1"/>
+          </a:fillRef>
+          <a:effectRef idx="1">
+            <a:schemeClr val="accent1"/>
+          </a:effectRef>
+          <a:fontRef idx="minor">
+            <a:schemeClr val="tx1"/>
+          </a:fontRef>
+        </p:style>
+      </p:cxnSp>
+      <p:cxnSp>
+        <p:nvCxnSpPr>
+          <p:cNvPr id="29" name="Straight Connector 28"/>
+          <p:cNvCxnSpPr/>
+          <p:nvPr/>
+        </p:nvCxnSpPr>
+        <p:spPr>
+          <a:xfrm>
+            <a:off x="4387892" y="5282400"/>
+            <a:ext cx="0" cy="658810"/>
+          </a:xfrm>
+          <a:prstGeom prst="line">
+            <a:avLst/>
+          </a:prstGeom>
+          <a:ln>
+            <a:solidFill>
+              <a:srgbClr val="000000"/>
+            </a:solidFill>
+          </a:ln>
+          <a:effectLst/>
+        </p:spPr>
+        <p:style>
+          <a:lnRef idx="2">
+            <a:schemeClr val="accent1"/>
+          </a:lnRef>
+          <a:fillRef idx="0">
+            <a:schemeClr val="accent1"/>
+          </a:fillRef>
+          <a:effectRef idx="1">
+            <a:schemeClr val="accent1"/>
+          </a:effectRef>
+          <a:fontRef idx="minor">
+            <a:schemeClr val="tx1"/>
+          </a:fontRef>
+        </p:style>
+      </p:cxnSp>
+      <p:cxnSp>
+        <p:nvCxnSpPr>
+          <p:cNvPr id="30" name="Straight Connector 29"/>
+          <p:cNvCxnSpPr/>
+          <p:nvPr/>
+        </p:nvCxnSpPr>
+        <p:spPr>
+          <a:xfrm>
+            <a:off x="4969667" y="5282400"/>
+            <a:ext cx="0" cy="658810"/>
+          </a:xfrm>
+          <a:prstGeom prst="line">
+            <a:avLst/>
+          </a:prstGeom>
+          <a:ln>
+            <a:solidFill>
+              <a:srgbClr val="000000"/>
+            </a:solidFill>
+          </a:ln>
+          <a:effectLst/>
+        </p:spPr>
+        <p:style>
+          <a:lnRef idx="2">
+            <a:schemeClr val="accent1"/>
+          </a:lnRef>
+          <a:fillRef idx="0">
+            <a:schemeClr val="accent1"/>
+          </a:fillRef>
+          <a:effectRef idx="1">
+            <a:schemeClr val="accent1"/>
+          </a:effectRef>
+          <a:fontRef idx="minor">
+            <a:schemeClr val="tx1"/>
+          </a:fontRef>
+        </p:style>
+      </p:cxnSp>
+      <p:sp>
+        <p:nvSpPr>
+          <p:cNvPr id="33" name="TextBox 32"/>
+          <p:cNvSpPr txBox="1"/>
+          <p:nvPr/>
+        </p:nvSpPr>
+        <p:spPr>
+          <a:xfrm>
+            <a:off x="2656079" y="5434799"/>
+            <a:ext cx="535648" cy="369332"/>
+          </a:xfrm>
+          <a:prstGeom prst="rect">
+            <a:avLst/>
+          </a:prstGeom>
+          <a:noFill/>
+        </p:spPr>
+        <p:txBody>
+          <a:bodyPr wrap="none" rtlCol="0">
+            <a:spAutoFit/>
+          </a:bodyPr>
+          <a:lstStyle/>
+          <a:p>
+            <a:r>
+              <a:rPr lang="en-US" dirty="0" smtClean="0"/>
+              <a:t>$25</a:t>
+            </a:r>
+            <a:endParaRPr lang="en-US" dirty="0"/>
+          </a:p>
+        </p:txBody>
+      </p:sp>
+      <p:sp>
+        <p:nvSpPr>
+          <p:cNvPr id="34" name="TextBox 33"/>
+          <p:cNvSpPr txBox="1"/>
+          <p:nvPr/>
+        </p:nvSpPr>
+        <p:spPr>
+          <a:xfrm>
+            <a:off x="3222275" y="5434799"/>
+            <a:ext cx="535648" cy="369332"/>
+          </a:xfrm>
+          <a:prstGeom prst="rect">
+            <a:avLst/>
+          </a:prstGeom>
+          <a:noFill/>
+        </p:spPr>
+        <p:txBody>
+          <a:bodyPr wrap="none" rtlCol="0">
+            <a:spAutoFit/>
+          </a:bodyPr>
+          <a:lstStyle/>
+          <a:p>
+            <a:r>
+              <a:rPr lang="en-US" dirty="0" smtClean="0"/>
+              <a:t>$50</a:t>
+            </a:r>
+            <a:endParaRPr lang="en-US" dirty="0"/>
+          </a:p>
+        </p:txBody>
+      </p:sp>
+      <p:sp>
+        <p:nvSpPr>
+          <p:cNvPr id="35" name="TextBox 34"/>
+          <p:cNvSpPr txBox="1"/>
+          <p:nvPr/>
+        </p:nvSpPr>
+        <p:spPr>
+          <a:xfrm>
+            <a:off x="3753758" y="5434799"/>
+            <a:ext cx="652643" cy="369332"/>
+          </a:xfrm>
+          <a:prstGeom prst="rect">
+            <a:avLst/>
+          </a:prstGeom>
+          <a:noFill/>
+        </p:spPr>
+        <p:txBody>
+          <a:bodyPr wrap="none" rtlCol="0">
+            <a:spAutoFit/>
+          </a:bodyPr>
+          <a:lstStyle/>
+          <a:p>
+            <a:r>
+              <a:rPr lang="en-US" dirty="0" smtClean="0"/>
+              <a:t>$100</a:t>
+            </a:r>
+            <a:endParaRPr lang="en-US" dirty="0"/>
+          </a:p>
+        </p:txBody>
+      </p:sp>
+      <p:sp>
+        <p:nvSpPr>
+          <p:cNvPr id="36" name="TextBox 35"/>
+          <p:cNvSpPr txBox="1"/>
+          <p:nvPr/>
+        </p:nvSpPr>
+        <p:spPr>
+          <a:xfrm>
+            <a:off x="4335454" y="5434799"/>
+            <a:ext cx="652643" cy="369332"/>
+          </a:xfrm>
+          <a:prstGeom prst="rect">
+            <a:avLst/>
+          </a:prstGeom>
+          <a:noFill/>
+        </p:spPr>
+        <p:txBody>
+          <a:bodyPr wrap="none" rtlCol="0">
+            <a:spAutoFit/>
+          </a:bodyPr>
+          <a:lstStyle/>
+          <a:p>
+            <a:r>
+              <a:rPr lang="en-US" dirty="0" smtClean="0"/>
+              <a:t>$250</a:t>
+            </a:r>
+            <a:endParaRPr lang="en-US" dirty="0"/>
+          </a:p>
+        </p:txBody>
+      </p:sp>
+      <p:sp>
+        <p:nvSpPr>
+          <p:cNvPr id="37" name="TextBox 36"/>
+          <p:cNvSpPr txBox="1"/>
+          <p:nvPr/>
+        </p:nvSpPr>
+        <p:spPr>
+          <a:xfrm>
+            <a:off x="4966357" y="5434799"/>
+            <a:ext cx="538579" cy="369332"/>
+          </a:xfrm>
+          <a:prstGeom prst="rect">
+            <a:avLst/>
+          </a:prstGeom>
+          <a:noFill/>
+        </p:spPr>
+        <p:txBody>
+          <a:bodyPr wrap="none" rtlCol="0">
+            <a:spAutoFit/>
+          </a:bodyPr>
+          <a:lstStyle/>
+          <a:p>
+            <a:r>
+              <a:rPr lang="en-US" dirty="0" smtClean="0"/>
+              <a:t>$1K</a:t>
+            </a:r>
+            <a:endParaRPr lang="en-US" dirty="0"/>
+          </a:p>
+        </p:txBody>
+      </p:sp>
+      <p:sp>
+        <p:nvSpPr>
+          <p:cNvPr id="24" name="TextBox 23"/>
+          <p:cNvSpPr txBox="1"/>
+          <p:nvPr/>
+        </p:nvSpPr>
+        <p:spPr>
+          <a:xfrm>
+            <a:off x="3209688" y="2796563"/>
+            <a:ext cx="1774630" cy="1405038"/>
+          </a:xfrm>
+          <a:prstGeom prst="rect">
+            <a:avLst/>
+          </a:prstGeom>
+          <a:noFill/>
+        </p:spPr>
+        <p:txBody>
+          <a:bodyPr wrap="square" rtlCol="0">
+            <a:prstTxWarp prst="textCanDown">
+              <a:avLst>
+                <a:gd name="adj" fmla="val 4887"/>
+              </a:avLst>
+            </a:prstTxWarp>
+            <a:spAutoFit/>
+          </a:bodyPr>
+          <a:lstStyle/>
+          <a:p>
+            <a:pPr algn="ctr"/>
+            <a:r>
+              <a:rPr lang="en-US" sz="1600" dirty="0" smtClean="0">
+                <a:solidFill>
+                  <a:srgbClr val="FF0000"/>
+                </a:solidFill>
+                <a:latin typeface="Avenir Black"/>
+                <a:cs typeface="Avenir Black"/>
+              </a:rPr>
+              <a:t>Game </a:t>
+            </a:r>
+          </a:p>
+          <a:p>
+            <a:pPr algn="ctr"/>
+            <a:r>
+              <a:rPr lang="en-US" sz="1600" dirty="0" smtClean="0">
+                <a:solidFill>
+                  <a:srgbClr val="FF0000"/>
+                </a:solidFill>
+                <a:latin typeface="Avenir Black"/>
+                <a:cs typeface="Avenir Black"/>
+              </a:rPr>
+              <a:t>Over</a:t>
+            </a:r>
+            <a:endParaRPr lang="en-US" sz="1600" dirty="0">
+              <a:solidFill>
+                <a:srgbClr val="FF0000"/>
+              </a:solidFill>
+              <a:latin typeface="Avenir Black"/>
+              <a:cs typeface="Avenir Black"/>
+            </a:endParaRPr>
+          </a:p>
+        </p:txBody>
+      </p:sp>
+      <p:sp>
+        <p:nvSpPr>
+          <p:cNvPr id="18" name="TextBox 17"/>
+          <p:cNvSpPr txBox="1"/>
+          <p:nvPr/>
+        </p:nvSpPr>
+        <p:spPr>
+          <a:xfrm>
+            <a:off x="3218751" y="4552860"/>
+            <a:ext cx="1774630" cy="364770"/>
+          </a:xfrm>
+          <a:prstGeom prst="rect">
+            <a:avLst/>
+          </a:prstGeom>
+          <a:noFill/>
+        </p:spPr>
+        <p:txBody>
+          <a:bodyPr wrap="square" rtlCol="0">
+            <a:prstTxWarp prst="textCanDown">
+              <a:avLst>
+                <a:gd name="adj" fmla="val 8733"/>
+              </a:avLst>
+            </a:prstTxWarp>
+            <a:spAutoFit/>
+          </a:bodyPr>
+          <a:lstStyle/>
+          <a:p>
+            <a:pPr algn="ctr"/>
+            <a:r>
+              <a:rPr lang="en-US" sz="1600" dirty="0" smtClean="0">
+                <a:solidFill>
+                  <a:srgbClr val="FFFF00"/>
+                </a:solidFill>
+                <a:latin typeface="Avenir Black"/>
+                <a:cs typeface="Avenir Black"/>
+              </a:rPr>
+              <a:t>START </a:t>
+            </a:r>
+            <a:r>
+              <a:rPr lang="en-US" sz="1600" dirty="0" smtClean="0">
+                <a:solidFill>
+                  <a:srgbClr val="FFFF00"/>
+                </a:solidFill>
+                <a:latin typeface="Avenir Black"/>
+                <a:cs typeface="Avenir Black"/>
+              </a:rPr>
+              <a:t>AGAIN</a:t>
+            </a:r>
+            <a:endParaRPr lang="en-US" sz="1600" dirty="0">
+              <a:solidFill>
+                <a:srgbClr val="FFFF00"/>
+              </a:solidFill>
+              <a:latin typeface="Avenir Black"/>
+              <a:cs typeface="Avenir Black"/>
+            </a:endParaRPr>
+          </a:p>
+        </p:txBody>
+      </p:sp>
+    </p:spTree>
+    <p:extLst>
+      <p:ext uri="{BB962C8B-B14F-4D97-AF65-F5344CB8AC3E}">
+        <p14:creationId xmlns:p14="http://schemas.microsoft.com/office/powerpoint/2010/main" val="1689008741"/>
+      </p:ext>
+    </p:extLst>
+  </p:cSld>
+  <p:clrMapOvr>
+    <a:masterClrMapping/>
+  </p:clrMapOvr>
+</p:sld>
+</file>
+
+<file path=ppt/slides/slide7.xml><?xml version="1.0" encoding="utf-8"?>
+<p:sld xmlns:a="http://schemas.openxmlformats.org/drawingml/2006/main" xmlns:r="http://schemas.openxmlformats.org/officeDocument/2006/relationships" xmlns:p="http://schemas.openxmlformats.org/presentationml/2006/main">
+  <p:cSld>
+    <p:spTree>
+      <p:nvGrpSpPr>
+        <p:cNvPr id="1" name=""/>
+        <p:cNvGrpSpPr/>
+        <p:nvPr/>
+      </p:nvGrpSpPr>
+      <p:grpSpPr>
+        <a:xfrm>
+          <a:off x="0" y="0"/>
+          <a:ext cx="0" cy="0"/>
+          <a:chOff x="0" y="0"/>
+          <a:chExt cx="0" cy="0"/>
+        </a:xfrm>
+      </p:grpSpPr>
+      <p:sp>
+        <p:nvSpPr>
+          <p:cNvPr id="4" name="Rectangle 3"/>
+          <p:cNvSpPr/>
+          <p:nvPr/>
+        </p:nvSpPr>
+        <p:spPr>
+          <a:xfrm>
+            <a:off x="2642567" y="1577494"/>
+            <a:ext cx="2908873" cy="4363716"/>
+          </a:xfrm>
+          <a:prstGeom prst="rect">
+            <a:avLst/>
+          </a:prstGeom>
+          <a:gradFill>
+            <a:gsLst>
+              <a:gs pos="0">
+                <a:srgbClr val="008000"/>
+              </a:gs>
+              <a:gs pos="86000">
+                <a:schemeClr val="accent3">
+                  <a:lumMod val="60000"/>
+                  <a:lumOff val="40000"/>
+                </a:schemeClr>
+              </a:gs>
+            </a:gsLst>
+            <a:lin ang="16740000" scaled="0"/>
+          </a:gradFill>
+          <a:ln>
+            <a:solidFill>
+              <a:schemeClr val="tx1"/>
+            </a:solidFill>
+          </a:ln>
+          <a:effectLst/>
+        </p:spPr>
+        <p:style>
+          <a:lnRef idx="1">
+            <a:schemeClr val="accent1"/>
+          </a:lnRef>
+          <a:fillRef idx="3">
+            <a:schemeClr val="accent1"/>
+          </a:fillRef>
+          <a:effectRef idx="2">
+            <a:schemeClr val="accent1"/>
+          </a:effectRef>
+          <a:fontRef idx="minor">
+            <a:schemeClr val="lt1"/>
+          </a:fontRef>
+        </p:style>
+        <p:txBody>
+          <a:bodyPr rtlCol="0" anchor="ctr"/>
+          <a:lstStyle/>
+          <a:p>
+            <a:pPr algn="ctr"/>
+            <a:endParaRPr lang="en-US" dirty="0"/>
+          </a:p>
+        </p:txBody>
+      </p:sp>
+      <p:pic>
+        <p:nvPicPr>
+          <p:cNvPr id="19" name="Picture 18" descr="Poker-Chips-psd31581.png"/>
+          <p:cNvPicPr>
+            <a:picLocks noChangeAspect="1"/>
+          </p:cNvPicPr>
+          <p:nvPr/>
+        </p:nvPicPr>
+        <p:blipFill>
+          <a:blip r:embed="rId2">
+            <a:extLst>
+              <a:ext uri="{28A0092B-C50C-407E-A947-70E740481C1C}">
+                <a14:useLocalDpi xmlns:a14="http://schemas.microsoft.com/office/drawing/2010/main" val="0"/>
+              </a:ext>
+            </a:extLst>
+          </a:blip>
+          <a:stretch>
+            <a:fillRect/>
+          </a:stretch>
+        </p:blipFill>
+        <p:spPr>
+          <a:xfrm>
+            <a:off x="2823934" y="1751129"/>
+            <a:ext cx="721830" cy="626188"/>
+          </a:xfrm>
+          <a:prstGeom prst="rect">
+            <a:avLst/>
+          </a:prstGeom>
+        </p:spPr>
+      </p:pic>
+      <p:pic>
+        <p:nvPicPr>
+          <p:cNvPr id="20" name="Picture 19" descr="Poker-Chips-psd31581.png"/>
+          <p:cNvPicPr>
+            <a:picLocks noChangeAspect="1"/>
+          </p:cNvPicPr>
+          <p:nvPr/>
+        </p:nvPicPr>
+        <p:blipFill>
+          <a:blip r:embed="rId2">
+            <a:extLst>
+              <a:ext uri="{28A0092B-C50C-407E-A947-70E740481C1C}">
+                <a14:useLocalDpi xmlns:a14="http://schemas.microsoft.com/office/drawing/2010/main" val="0"/>
+              </a:ext>
+            </a:extLst>
+          </a:blip>
+          <a:stretch>
+            <a:fillRect/>
+          </a:stretch>
+        </p:blipFill>
+        <p:spPr>
+          <a:xfrm>
+            <a:off x="3063117" y="1645044"/>
+            <a:ext cx="721830" cy="626188"/>
+          </a:xfrm>
+          <a:prstGeom prst="rect">
+            <a:avLst/>
+          </a:prstGeom>
+        </p:spPr>
+      </p:pic>
+      <p:pic>
+        <p:nvPicPr>
+          <p:cNvPr id="21" name="Picture 20" descr="Poker-Chips-psd31581.png"/>
+          <p:cNvPicPr>
+            <a:picLocks noChangeAspect="1"/>
+          </p:cNvPicPr>
+          <p:nvPr/>
+        </p:nvPicPr>
+        <p:blipFill>
+          <a:blip r:embed="rId2">
+            <a:extLst>
+              <a:ext uri="{28A0092B-C50C-407E-A947-70E740481C1C}">
+                <a14:useLocalDpi xmlns:a14="http://schemas.microsoft.com/office/drawing/2010/main" val="0"/>
+              </a:ext>
+            </a:extLst>
+          </a:blip>
+          <a:stretch>
+            <a:fillRect/>
+          </a:stretch>
+        </p:blipFill>
+        <p:spPr>
+          <a:xfrm>
+            <a:off x="3198237" y="1805169"/>
+            <a:ext cx="721830" cy="626188"/>
+          </a:xfrm>
+          <a:prstGeom prst="rect">
+            <a:avLst/>
+          </a:prstGeom>
+        </p:spPr>
+      </p:pic>
+      <p:sp>
+        <p:nvSpPr>
+          <p:cNvPr id="22" name="Rectangle 21"/>
+          <p:cNvSpPr/>
+          <p:nvPr/>
+        </p:nvSpPr>
+        <p:spPr>
+          <a:xfrm>
+            <a:off x="2642567" y="4958160"/>
+            <a:ext cx="2908873" cy="324240"/>
+          </a:xfrm>
+          <a:prstGeom prst="rect">
+            <a:avLst/>
+          </a:prstGeom>
+          <a:solidFill>
+            <a:srgbClr val="FFFFFF"/>
+          </a:solidFill>
+          <a:ln>
+            <a:solidFill>
+              <a:srgbClr val="000000"/>
+            </a:solidFill>
+          </a:ln>
+          <a:effectLst/>
+        </p:spPr>
+        <p:style>
+          <a:lnRef idx="1">
+            <a:schemeClr val="accent1"/>
+          </a:lnRef>
+          <a:fillRef idx="3">
+            <a:schemeClr val="accent1"/>
+          </a:fillRef>
+          <a:effectRef idx="2">
+            <a:schemeClr val="accent1"/>
+          </a:effectRef>
+          <a:fontRef idx="minor">
+            <a:schemeClr val="lt1"/>
+          </a:fontRef>
+        </p:style>
+        <p:txBody>
+          <a:bodyPr rtlCol="0" anchor="ctr"/>
+          <a:lstStyle/>
+          <a:p>
+            <a:pPr algn="ctr"/>
+            <a:endParaRPr lang="en-US"/>
+          </a:p>
+        </p:txBody>
+      </p:sp>
+      <p:sp>
+        <p:nvSpPr>
+          <p:cNvPr id="23" name="Rectangle 22"/>
+          <p:cNvSpPr/>
+          <p:nvPr/>
+        </p:nvSpPr>
+        <p:spPr>
+          <a:xfrm>
+            <a:off x="2642567" y="5282400"/>
+            <a:ext cx="2908873" cy="658810"/>
+          </a:xfrm>
+          <a:prstGeom prst="rect">
+            <a:avLst/>
+          </a:prstGeom>
+          <a:gradFill flip="none" rotWithShape="1">
+            <a:gsLst>
+              <a:gs pos="0">
+                <a:schemeClr val="accent6"/>
+              </a:gs>
+              <a:gs pos="100000">
+                <a:schemeClr val="accent6">
+                  <a:lumMod val="60000"/>
+                  <a:lumOff val="40000"/>
+                </a:schemeClr>
+              </a:gs>
+            </a:gsLst>
+            <a:lin ang="16200000" scaled="0"/>
+            <a:tileRect/>
+          </a:gradFill>
+          <a:ln>
+            <a:solidFill>
+              <a:srgbClr val="000000"/>
+            </a:solidFill>
+          </a:ln>
+          <a:effectLst/>
+        </p:spPr>
+        <p:style>
+          <a:lnRef idx="1">
+            <a:schemeClr val="accent1"/>
+          </a:lnRef>
+          <a:fillRef idx="3">
+            <a:schemeClr val="accent1"/>
+          </a:fillRef>
+          <a:effectRef idx="2">
+            <a:schemeClr val="accent1"/>
+          </a:effectRef>
+          <a:fontRef idx="minor">
+            <a:schemeClr val="lt1"/>
+          </a:fontRef>
+        </p:style>
+        <p:txBody>
+          <a:bodyPr rtlCol="0" anchor="ctr"/>
+          <a:lstStyle/>
+          <a:p>
+            <a:pPr algn="ctr"/>
+            <a:endParaRPr lang="en-US"/>
+          </a:p>
+        </p:txBody>
+      </p:sp>
+      <p:cxnSp>
+        <p:nvCxnSpPr>
+          <p:cNvPr id="26" name="Straight Connector 25"/>
+          <p:cNvCxnSpPr/>
+          <p:nvPr/>
+        </p:nvCxnSpPr>
+        <p:spPr>
+          <a:xfrm>
+            <a:off x="3224342" y="5282400"/>
+            <a:ext cx="0" cy="658810"/>
+          </a:xfrm>
+          <a:prstGeom prst="line">
+            <a:avLst/>
+          </a:prstGeom>
+          <a:ln>
+            <a:solidFill>
+              <a:srgbClr val="000000"/>
+            </a:solidFill>
+          </a:ln>
+          <a:effectLst/>
+        </p:spPr>
+        <p:style>
+          <a:lnRef idx="2">
+            <a:schemeClr val="accent1"/>
+          </a:lnRef>
+          <a:fillRef idx="0">
+            <a:schemeClr val="accent1"/>
+          </a:fillRef>
+          <a:effectRef idx="1">
+            <a:schemeClr val="accent1"/>
+          </a:effectRef>
+          <a:fontRef idx="minor">
+            <a:schemeClr val="tx1"/>
+          </a:fontRef>
+        </p:style>
+      </p:cxnSp>
+      <p:cxnSp>
+        <p:nvCxnSpPr>
+          <p:cNvPr id="28" name="Straight Connector 27"/>
+          <p:cNvCxnSpPr/>
+          <p:nvPr/>
+        </p:nvCxnSpPr>
+        <p:spPr>
+          <a:xfrm>
+            <a:off x="3806117" y="5282400"/>
+            <a:ext cx="0" cy="658810"/>
+          </a:xfrm>
+          <a:prstGeom prst="line">
+            <a:avLst/>
+          </a:prstGeom>
+          <a:ln>
+            <a:solidFill>
+              <a:srgbClr val="000000"/>
+            </a:solidFill>
+          </a:ln>
+          <a:effectLst/>
+        </p:spPr>
+        <p:style>
+          <a:lnRef idx="2">
+            <a:schemeClr val="accent1"/>
+          </a:lnRef>
+          <a:fillRef idx="0">
+            <a:schemeClr val="accent1"/>
+          </a:fillRef>
+          <a:effectRef idx="1">
+            <a:schemeClr val="accent1"/>
+          </a:effectRef>
+          <a:fontRef idx="minor">
+            <a:schemeClr val="tx1"/>
+          </a:fontRef>
+        </p:style>
+      </p:cxnSp>
+      <p:cxnSp>
+        <p:nvCxnSpPr>
+          <p:cNvPr id="29" name="Straight Connector 28"/>
+          <p:cNvCxnSpPr/>
+          <p:nvPr/>
+        </p:nvCxnSpPr>
+        <p:spPr>
+          <a:xfrm>
+            <a:off x="4387892" y="5282400"/>
+            <a:ext cx="0" cy="658810"/>
+          </a:xfrm>
+          <a:prstGeom prst="line">
+            <a:avLst/>
+          </a:prstGeom>
+          <a:ln>
+            <a:solidFill>
+              <a:srgbClr val="000000"/>
+            </a:solidFill>
+          </a:ln>
+          <a:effectLst/>
+        </p:spPr>
+        <p:style>
+          <a:lnRef idx="2">
+            <a:schemeClr val="accent1"/>
+          </a:lnRef>
+          <a:fillRef idx="0">
+            <a:schemeClr val="accent1"/>
+          </a:fillRef>
+          <a:effectRef idx="1">
+            <a:schemeClr val="accent1"/>
+          </a:effectRef>
+          <a:fontRef idx="minor">
+            <a:schemeClr val="tx1"/>
+          </a:fontRef>
+        </p:style>
+      </p:cxnSp>
+      <p:cxnSp>
+        <p:nvCxnSpPr>
+          <p:cNvPr id="30" name="Straight Connector 29"/>
+          <p:cNvCxnSpPr/>
+          <p:nvPr/>
+        </p:nvCxnSpPr>
+        <p:spPr>
+          <a:xfrm>
+            <a:off x="4969667" y="5282400"/>
+            <a:ext cx="0" cy="658810"/>
+          </a:xfrm>
+          <a:prstGeom prst="line">
+            <a:avLst/>
+          </a:prstGeom>
+          <a:ln>
+            <a:solidFill>
+              <a:srgbClr val="000000"/>
+            </a:solidFill>
+          </a:ln>
+          <a:effectLst/>
+        </p:spPr>
+        <p:style>
+          <a:lnRef idx="2">
+            <a:schemeClr val="accent1"/>
+          </a:lnRef>
+          <a:fillRef idx="0">
+            <a:schemeClr val="accent1"/>
+          </a:fillRef>
+          <a:effectRef idx="1">
+            <a:schemeClr val="accent1"/>
+          </a:effectRef>
+          <a:fontRef idx="minor">
+            <a:schemeClr val="tx1"/>
+          </a:fontRef>
+        </p:style>
+      </p:cxnSp>
+      <p:sp>
+        <p:nvSpPr>
+          <p:cNvPr id="33" name="TextBox 32"/>
+          <p:cNvSpPr txBox="1"/>
+          <p:nvPr/>
+        </p:nvSpPr>
+        <p:spPr>
+          <a:xfrm>
+            <a:off x="2656079" y="5434799"/>
+            <a:ext cx="535648" cy="369332"/>
+          </a:xfrm>
+          <a:prstGeom prst="rect">
+            <a:avLst/>
+          </a:prstGeom>
+          <a:noFill/>
+        </p:spPr>
+        <p:txBody>
+          <a:bodyPr wrap="none" rtlCol="0">
+            <a:spAutoFit/>
+          </a:bodyPr>
+          <a:lstStyle/>
+          <a:p>
+            <a:r>
+              <a:rPr lang="en-US" dirty="0" smtClean="0"/>
+              <a:t>$25</a:t>
+            </a:r>
+            <a:endParaRPr lang="en-US" dirty="0"/>
+          </a:p>
+        </p:txBody>
+      </p:sp>
+      <p:sp>
+        <p:nvSpPr>
+          <p:cNvPr id="34" name="TextBox 33"/>
+          <p:cNvSpPr txBox="1"/>
+          <p:nvPr/>
+        </p:nvSpPr>
+        <p:spPr>
+          <a:xfrm>
+            <a:off x="3222275" y="5434799"/>
+            <a:ext cx="535648" cy="369332"/>
+          </a:xfrm>
+          <a:prstGeom prst="rect">
+            <a:avLst/>
+          </a:prstGeom>
+          <a:noFill/>
+        </p:spPr>
+        <p:txBody>
+          <a:bodyPr wrap="none" rtlCol="0">
+            <a:spAutoFit/>
+          </a:bodyPr>
+          <a:lstStyle/>
+          <a:p>
+            <a:r>
+              <a:rPr lang="en-US" dirty="0" smtClean="0"/>
+              <a:t>$50</a:t>
+            </a:r>
+            <a:endParaRPr lang="en-US" dirty="0"/>
+          </a:p>
+        </p:txBody>
+      </p:sp>
+      <p:sp>
+        <p:nvSpPr>
+          <p:cNvPr id="35" name="TextBox 34"/>
+          <p:cNvSpPr txBox="1"/>
+          <p:nvPr/>
+        </p:nvSpPr>
+        <p:spPr>
+          <a:xfrm>
+            <a:off x="3753758" y="5434799"/>
+            <a:ext cx="652643" cy="369332"/>
+          </a:xfrm>
+          <a:prstGeom prst="rect">
+            <a:avLst/>
+          </a:prstGeom>
+          <a:noFill/>
+        </p:spPr>
+        <p:txBody>
+          <a:bodyPr wrap="none" rtlCol="0">
+            <a:spAutoFit/>
+          </a:bodyPr>
+          <a:lstStyle/>
+          <a:p>
+            <a:r>
+              <a:rPr lang="en-US" dirty="0" smtClean="0"/>
+              <a:t>$100</a:t>
+            </a:r>
+            <a:endParaRPr lang="en-US" dirty="0"/>
+          </a:p>
+        </p:txBody>
+      </p:sp>
+      <p:sp>
+        <p:nvSpPr>
+          <p:cNvPr id="36" name="TextBox 35"/>
+          <p:cNvSpPr txBox="1"/>
+          <p:nvPr/>
+        </p:nvSpPr>
+        <p:spPr>
+          <a:xfrm>
+            <a:off x="4335454" y="5434799"/>
+            <a:ext cx="652643" cy="369332"/>
+          </a:xfrm>
+          <a:prstGeom prst="rect">
+            <a:avLst/>
+          </a:prstGeom>
+          <a:noFill/>
+        </p:spPr>
+        <p:txBody>
+          <a:bodyPr wrap="none" rtlCol="0">
+            <a:spAutoFit/>
+          </a:bodyPr>
+          <a:lstStyle/>
+          <a:p>
+            <a:r>
+              <a:rPr lang="en-US" dirty="0" smtClean="0"/>
+              <a:t>$250</a:t>
+            </a:r>
+            <a:endParaRPr lang="en-US" dirty="0"/>
+          </a:p>
+        </p:txBody>
+      </p:sp>
+      <p:sp>
+        <p:nvSpPr>
+          <p:cNvPr id="37" name="TextBox 36"/>
+          <p:cNvSpPr txBox="1"/>
+          <p:nvPr/>
+        </p:nvSpPr>
+        <p:spPr>
+          <a:xfrm>
+            <a:off x="4966357" y="5434799"/>
+            <a:ext cx="538579" cy="369332"/>
+          </a:xfrm>
+          <a:prstGeom prst="rect">
+            <a:avLst/>
+          </a:prstGeom>
+          <a:noFill/>
+        </p:spPr>
+        <p:txBody>
+          <a:bodyPr wrap="none" rtlCol="0">
+            <a:spAutoFit/>
+          </a:bodyPr>
+          <a:lstStyle/>
+          <a:p>
+            <a:r>
+              <a:rPr lang="en-US" dirty="0" smtClean="0"/>
+              <a:t>$1K</a:t>
+            </a:r>
+            <a:endParaRPr lang="en-US" dirty="0"/>
+          </a:p>
+        </p:txBody>
+      </p:sp>
+      <p:sp>
+        <p:nvSpPr>
+          <p:cNvPr id="24" name="TextBox 23"/>
+          <p:cNvSpPr txBox="1"/>
+          <p:nvPr/>
+        </p:nvSpPr>
+        <p:spPr>
+          <a:xfrm>
+            <a:off x="3218751" y="4552860"/>
+            <a:ext cx="1774630" cy="364770"/>
+          </a:xfrm>
+          <a:prstGeom prst="rect">
+            <a:avLst/>
+          </a:prstGeom>
+          <a:noFill/>
+        </p:spPr>
+        <p:txBody>
+          <a:bodyPr wrap="square" rtlCol="0">
+            <a:prstTxWarp prst="textCanDown">
+              <a:avLst>
+                <a:gd name="adj" fmla="val 8733"/>
+              </a:avLst>
+            </a:prstTxWarp>
+            <a:spAutoFit/>
+          </a:bodyPr>
+          <a:lstStyle/>
+          <a:p>
+            <a:pPr algn="ctr"/>
+            <a:r>
+              <a:rPr lang="en-US" sz="1600" dirty="0" smtClean="0">
+                <a:solidFill>
+                  <a:srgbClr val="FFFF00"/>
+                </a:solidFill>
+                <a:latin typeface="Avenir Black"/>
+                <a:cs typeface="Avenir Black"/>
+              </a:rPr>
               <a:t>CLEAR BET</a:t>
             </a:r>
             <a:endParaRPr lang="en-US" sz="1600" dirty="0">
@@ -5893,7 +7917,7 @@
 </p:sld>
 </file>
 
-<file path=ppt/slides/slide5.xml><?xml version="1.0" encoding="utf-8"?>
+<file path=ppt/slides/slide8.xml><?xml version="1.0" encoding="utf-8"?>
 <p:sld xmlns:a="http://schemas.openxmlformats.org/drawingml/2006/main" xmlns:r="http://schemas.openxmlformats.org/officeDocument/2006/relationships" xmlns:p="http://schemas.openxmlformats.org/presentationml/2006/main">
   <p:cSld>
     <p:spTree>

</xml_diff>